<commit_message>
Updated powerpoint with list of undates since RFC8561
</commit_message>
<xml_diff>
--- a/presentations/2025-04-10-rfc8561bis-status.pptx
+++ b/presentations/2025-04-10-rfc8561bis-status.pptx
@@ -7,9 +7,10 @@
   <p:sldIdLst>
     <p:sldId id="256" r:id="rId2"/>
     <p:sldId id="257" r:id="rId3"/>
-    <p:sldId id="258" r:id="rId4"/>
-    <p:sldId id="259" r:id="rId5"/>
-    <p:sldId id="260" r:id="rId6"/>
+    <p:sldId id="261" r:id="rId4"/>
+    <p:sldId id="258" r:id="rId5"/>
+    <p:sldId id="259" r:id="rId6"/>
+    <p:sldId id="260" r:id="rId7"/>
   </p:sldIdLst>
   <p:sldSz cx="12192000" cy="6858000"/>
   <p:notesSz cx="6858000" cy="9144000"/>
@@ -108,6 +109,11 @@
       </a:defRPr>
     </a:lvl9pPr>
   </p:defaultTextStyle>
+  <p:extLst>
+    <p:ext uri="{EFAFB233-063F-42B5-8137-9DF3F51BA10A}">
+      <p15:sldGuideLst xmlns:p15="http://schemas.microsoft.com/office/powerpoint/2012/main"/>
+    </p:ext>
+  </p:extLst>
 </p:presentation>
 </file>
 
@@ -258,7 +264,7 @@
           <a:p>
             <a:fld id="{FE4DAA4D-2DD7-B04C-A9A8-4DBE8BAD6685}" type="datetimeFigureOut">
               <a:rPr lang="en-US" smtClean="0"/>
-              <a:t>4/4/25</a:t>
+              <a:t>4/7/25</a:t>
             </a:fld>
             <a:endParaRPr lang="en-US"/>
           </a:p>
@@ -456,7 +462,7 @@
           <a:p>
             <a:fld id="{FE4DAA4D-2DD7-B04C-A9A8-4DBE8BAD6685}" type="datetimeFigureOut">
               <a:rPr lang="en-US" smtClean="0"/>
-              <a:t>4/4/25</a:t>
+              <a:t>4/7/25</a:t>
             </a:fld>
             <a:endParaRPr lang="en-US"/>
           </a:p>
@@ -664,7 +670,7 @@
           <a:p>
             <a:fld id="{FE4DAA4D-2DD7-B04C-A9A8-4DBE8BAD6685}" type="datetimeFigureOut">
               <a:rPr lang="en-US" smtClean="0"/>
-              <a:t>4/4/25</a:t>
+              <a:t>4/7/25</a:t>
             </a:fld>
             <a:endParaRPr lang="en-US"/>
           </a:p>
@@ -862,7 +868,7 @@
           <a:p>
             <a:fld id="{FE4DAA4D-2DD7-B04C-A9A8-4DBE8BAD6685}" type="datetimeFigureOut">
               <a:rPr lang="en-US" smtClean="0"/>
-              <a:t>4/4/25</a:t>
+              <a:t>4/7/25</a:t>
             </a:fld>
             <a:endParaRPr lang="en-US"/>
           </a:p>
@@ -1137,7 +1143,7 @@
           <a:p>
             <a:fld id="{FE4DAA4D-2DD7-B04C-A9A8-4DBE8BAD6685}" type="datetimeFigureOut">
               <a:rPr lang="en-US" smtClean="0"/>
-              <a:t>4/4/25</a:t>
+              <a:t>4/7/25</a:t>
             </a:fld>
             <a:endParaRPr lang="en-US"/>
           </a:p>
@@ -1402,7 +1408,7 @@
           <a:p>
             <a:fld id="{FE4DAA4D-2DD7-B04C-A9A8-4DBE8BAD6685}" type="datetimeFigureOut">
               <a:rPr lang="en-US" smtClean="0"/>
-              <a:t>4/4/25</a:t>
+              <a:t>4/7/25</a:t>
             </a:fld>
             <a:endParaRPr lang="en-US"/>
           </a:p>
@@ -1814,7 +1820,7 @@
           <a:p>
             <a:fld id="{FE4DAA4D-2DD7-B04C-A9A8-4DBE8BAD6685}" type="datetimeFigureOut">
               <a:rPr lang="en-US" smtClean="0"/>
-              <a:t>4/4/25</a:t>
+              <a:t>4/7/25</a:t>
             </a:fld>
             <a:endParaRPr lang="en-US"/>
           </a:p>
@@ -1955,7 +1961,7 @@
           <a:p>
             <a:fld id="{FE4DAA4D-2DD7-B04C-A9A8-4DBE8BAD6685}" type="datetimeFigureOut">
               <a:rPr lang="en-US" smtClean="0"/>
-              <a:t>4/4/25</a:t>
+              <a:t>4/7/25</a:t>
             </a:fld>
             <a:endParaRPr lang="en-US"/>
           </a:p>
@@ -2068,7 +2074,7 @@
           <a:p>
             <a:fld id="{FE4DAA4D-2DD7-B04C-A9A8-4DBE8BAD6685}" type="datetimeFigureOut">
               <a:rPr lang="en-US" smtClean="0"/>
-              <a:t>4/4/25</a:t>
+              <a:t>4/7/25</a:t>
             </a:fld>
             <a:endParaRPr lang="en-US"/>
           </a:p>
@@ -2379,7 +2385,7 @@
           <a:p>
             <a:fld id="{FE4DAA4D-2DD7-B04C-A9A8-4DBE8BAD6685}" type="datetimeFigureOut">
               <a:rPr lang="en-US" smtClean="0"/>
-              <a:t>4/4/25</a:t>
+              <a:t>4/7/25</a:t>
             </a:fld>
             <a:endParaRPr lang="en-US"/>
           </a:p>
@@ -2667,7 +2673,7 @@
           <a:p>
             <a:fld id="{FE4DAA4D-2DD7-B04C-A9A8-4DBE8BAD6685}" type="datetimeFigureOut">
               <a:rPr lang="en-US" smtClean="0"/>
-              <a:t>4/4/25</a:t>
+              <a:t>4/7/25</a:t>
             </a:fld>
             <a:endParaRPr lang="en-US"/>
           </a:p>
@@ -2908,7 +2914,7 @@
           <a:p>
             <a:fld id="{FE4DAA4D-2DD7-B04C-A9A8-4DBE8BAD6685}" type="datetimeFigureOut">
               <a:rPr lang="en-US" smtClean="0"/>
-              <a:t>4/4/25</a:t>
+              <a:t>4/7/25</a:t>
             </a:fld>
             <a:endParaRPr lang="en-US"/>
           </a:p>
@@ -3514,7 +3520,15 @@
             <a:pPr lvl="1"/>
             <a:r>
               <a:rPr lang="en-US" dirty="0"/>
-              <a:t>Purpose is to add functionality and align with work from ETSI plug-fests to provide a single standard model for microwave radio links</a:t>
+              <a:t>Purpose is to add functionality and align with work from ETSI </a:t>
+            </a:r>
+            <a:r>
+              <a:rPr lang="en-US" dirty="0" err="1"/>
+              <a:t>plugtests</a:t>
+            </a:r>
+            <a:r>
+              <a:rPr lang="en-US" dirty="0"/>
+              <a:t> to provide a single standard model for microwave radio links</a:t>
             </a:r>
           </a:p>
           <a:p>
@@ -3564,7 +3578,7 @@
           <p:cNvPr id="2" name="Title 1">
             <a:extLst>
               <a:ext uri="{FF2B5EF4-FFF2-40B4-BE49-F238E27FC236}">
-                <a16:creationId xmlns:a16="http://schemas.microsoft.com/office/drawing/2014/main" id="{39A9C14B-54AB-D251-EBDA-C6A7F5B72F18}"/>
+                <a16:creationId xmlns:a16="http://schemas.microsoft.com/office/drawing/2014/main" id="{70768125-90AC-0B8D-CBF8-E4FDCD9F2AC1}"/>
               </a:ext>
             </a:extLst>
           </p:cNvPr>
@@ -3582,7 +3596,7 @@
           <a:p>
             <a:r>
               <a:rPr lang="en-US" dirty="0"/>
-              <a:t>Current Issues</a:t>
+              <a:t>New Functionalities</a:t>
             </a:r>
           </a:p>
         </p:txBody>
@@ -3592,7 +3606,7 @@
           <p:cNvPr id="3" name="Content Placeholder 2">
             <a:extLst>
               <a:ext uri="{FF2B5EF4-FFF2-40B4-BE49-F238E27FC236}">
-                <a16:creationId xmlns:a16="http://schemas.microsoft.com/office/drawing/2014/main" id="{97575B3E-CBC5-427D-6F18-6CC875B4F986}"/>
+                <a16:creationId xmlns:a16="http://schemas.microsoft.com/office/drawing/2014/main" id="{869A74A7-E305-C945-0C91-CE08324A3B78}"/>
               </a:ext>
             </a:extLst>
           </p:cNvPr>
@@ -3605,85 +3619,52 @@
         </p:nvSpPr>
         <p:spPr/>
         <p:txBody>
-          <a:bodyPr>
-            <a:normAutofit fontScale="92500"/>
-          </a:bodyPr>
-          <a:lstStyle/>
-          <a:p>
+          <a:bodyPr/>
+          <a:lstStyle/>
+          <a:p>
+            <a:r>
+              <a:rPr lang="en-US" dirty="0"/>
+              <a:t>Clean-up, creating common-microwave-properties to reduce duplication</a:t>
+            </a:r>
+          </a:p>
+          <a:p>
+            <a:r>
+              <a:rPr lang="en-US" dirty="0"/>
+              <a:t>Added missing configuration parameter for minimum-nominal-power</a:t>
+            </a:r>
+          </a:p>
+          <a:p>
+            <a:r>
+              <a:rPr lang="en-US" dirty="0"/>
+              <a:t>Header Compression profile definition</a:t>
+            </a:r>
+          </a:p>
+          <a:p>
+            <a:r>
+              <a:rPr lang="en-US" dirty="0"/>
+              <a:t>Adaptive Code Modulation definition</a:t>
+            </a:r>
+          </a:p>
+          <a:p>
+            <a:r>
+              <a:rPr lang="en-US" dirty="0"/>
+              <a:t>Deprecation of existing radio link terminal mode </a:t>
+            </a:r>
             <a:r>
               <a:rPr lang="en-US" dirty="0" err="1"/>
-              <a:t>Github</a:t>
-            </a:r>
-            <a:r>
-              <a:rPr lang="en-US" dirty="0"/>
-              <a:t>: </a:t>
-            </a:r>
-            <a:r>
-              <a:rPr lang="en-US" dirty="0">
-                <a:hlinkClick r:id="rId2"/>
-              </a:rPr>
-              <a:t>https://github.com/samans/draft-ybam-rfc8561bis</a:t>
+              <a:t>defintion</a:t>
             </a:r>
             <a:endParaRPr lang="en-US" dirty="0"/>
           </a:p>
           <a:p>
-            <a:r>
-              <a:rPr lang="en-US" dirty="0"/>
-              <a:t>Issues list: </a:t>
-            </a:r>
-            <a:r>
-              <a:rPr lang="en-US" dirty="0">
-                <a:hlinkClick r:id="rId3"/>
-              </a:rPr>
-              <a:t>https://github.com/samans/draft-ybam-rfc8561bis/issues</a:t>
-            </a:r>
             <a:endParaRPr lang="en-US" dirty="0"/>
-          </a:p>
-          <a:p>
-            <a:endParaRPr lang="en-US" dirty="0"/>
-          </a:p>
-          <a:p>
-            <a:r>
-              <a:rPr lang="en-US" dirty="0"/>
-              <a:t>Band and Carrier Aggregation</a:t>
-            </a:r>
-          </a:p>
-          <a:p>
-            <a:r>
-              <a:rPr lang="en-US" dirty="0"/>
-              <a:t>Fixing coding-modulations</a:t>
-            </a:r>
-          </a:p>
-          <a:p>
-            <a:r>
-              <a:rPr lang="en-US" dirty="0"/>
-              <a:t>Radio-Signal-Id</a:t>
-            </a:r>
-          </a:p>
-          <a:p>
-            <a:r>
-              <a:rPr lang="en-US" dirty="0"/>
-              <a:t>XPIC</a:t>
-            </a:r>
-          </a:p>
-          <a:p>
-            <a:r>
-              <a:rPr lang="en-US" dirty="0"/>
-              <a:t>Alignment with ETSI work</a:t>
-            </a:r>
-          </a:p>
-          <a:p>
-            <a:r>
-              <a:rPr lang="en-US" dirty="0"/>
-              <a:t>Several editorials and guidelines related fixes</a:t>
-            </a:r>
           </a:p>
         </p:txBody>
       </p:sp>
     </p:spTree>
     <p:extLst>
       <p:ext uri="{BB962C8B-B14F-4D97-AF65-F5344CB8AC3E}">
-        <p14:creationId xmlns:p14="http://schemas.microsoft.com/office/powerpoint/2010/main" val="1148745288"/>
+        <p14:creationId xmlns:p14="http://schemas.microsoft.com/office/powerpoint/2010/main" val="4266197983"/>
       </p:ext>
     </p:extLst>
   </p:cSld>
@@ -3715,6 +3696,157 @@
           <p:cNvPr id="2" name="Title 1">
             <a:extLst>
               <a:ext uri="{FF2B5EF4-FFF2-40B4-BE49-F238E27FC236}">
+                <a16:creationId xmlns:a16="http://schemas.microsoft.com/office/drawing/2014/main" id="{39A9C14B-54AB-D251-EBDA-C6A7F5B72F18}"/>
+              </a:ext>
+            </a:extLst>
+          </p:cNvPr>
+          <p:cNvSpPr>
+            <a:spLocks noGrp="1"/>
+          </p:cNvSpPr>
+          <p:nvPr>
+            <p:ph type="title"/>
+          </p:nvPr>
+        </p:nvSpPr>
+        <p:spPr/>
+        <p:txBody>
+          <a:bodyPr/>
+          <a:lstStyle/>
+          <a:p>
+            <a:r>
+              <a:rPr lang="en-US" dirty="0"/>
+              <a:t>Current Issues</a:t>
+            </a:r>
+          </a:p>
+        </p:txBody>
+      </p:sp>
+      <p:sp>
+        <p:nvSpPr>
+          <p:cNvPr id="3" name="Content Placeholder 2">
+            <a:extLst>
+              <a:ext uri="{FF2B5EF4-FFF2-40B4-BE49-F238E27FC236}">
+                <a16:creationId xmlns:a16="http://schemas.microsoft.com/office/drawing/2014/main" id="{97575B3E-CBC5-427D-6F18-6CC875B4F986}"/>
+              </a:ext>
+            </a:extLst>
+          </p:cNvPr>
+          <p:cNvSpPr>
+            <a:spLocks noGrp="1"/>
+          </p:cNvSpPr>
+          <p:nvPr>
+            <p:ph idx="1"/>
+          </p:nvPr>
+        </p:nvSpPr>
+        <p:spPr/>
+        <p:txBody>
+          <a:bodyPr>
+            <a:normAutofit fontScale="92500"/>
+          </a:bodyPr>
+          <a:lstStyle/>
+          <a:p>
+            <a:r>
+              <a:rPr lang="en-US" dirty="0" err="1"/>
+              <a:t>Github</a:t>
+            </a:r>
+            <a:r>
+              <a:rPr lang="en-US" dirty="0"/>
+              <a:t>: </a:t>
+            </a:r>
+            <a:r>
+              <a:rPr lang="en-US" dirty="0">
+                <a:hlinkClick r:id="rId2"/>
+              </a:rPr>
+              <a:t>https://github.com/samans/draft-ybam-rfc8561bis</a:t>
+            </a:r>
+            <a:endParaRPr lang="en-US" dirty="0"/>
+          </a:p>
+          <a:p>
+            <a:r>
+              <a:rPr lang="en-US" dirty="0"/>
+              <a:t>Issues list: </a:t>
+            </a:r>
+            <a:r>
+              <a:rPr lang="en-US" dirty="0">
+                <a:hlinkClick r:id="rId3"/>
+              </a:rPr>
+              <a:t>https://github.com/samans/draft-ybam-rfc8561bis/issues</a:t>
+            </a:r>
+            <a:endParaRPr lang="en-US" dirty="0"/>
+          </a:p>
+          <a:p>
+            <a:endParaRPr lang="en-US" dirty="0"/>
+          </a:p>
+          <a:p>
+            <a:r>
+              <a:rPr lang="en-US" dirty="0"/>
+              <a:t>Band and Carrier Aggregation</a:t>
+            </a:r>
+          </a:p>
+          <a:p>
+            <a:r>
+              <a:rPr lang="en-US" dirty="0"/>
+              <a:t>Fixing coding-modulations</a:t>
+            </a:r>
+          </a:p>
+          <a:p>
+            <a:r>
+              <a:rPr lang="en-US" dirty="0"/>
+              <a:t>Radio-Signal-Id</a:t>
+            </a:r>
+          </a:p>
+          <a:p>
+            <a:r>
+              <a:rPr lang="en-US" dirty="0"/>
+              <a:t>XPIC</a:t>
+            </a:r>
+          </a:p>
+          <a:p>
+            <a:r>
+              <a:rPr lang="en-US" dirty="0"/>
+              <a:t>Alignment with ETSI work</a:t>
+            </a:r>
+          </a:p>
+          <a:p>
+            <a:r>
+              <a:rPr lang="en-US" dirty="0"/>
+              <a:t>Several editorials and guidelines related fixes</a:t>
+            </a:r>
+          </a:p>
+        </p:txBody>
+      </p:sp>
+    </p:spTree>
+    <p:extLst>
+      <p:ext uri="{BB962C8B-B14F-4D97-AF65-F5344CB8AC3E}">
+        <p14:creationId xmlns:p14="http://schemas.microsoft.com/office/powerpoint/2010/main" val="1148745288"/>
+      </p:ext>
+    </p:extLst>
+  </p:cSld>
+  <p:clrMapOvr>
+    <a:masterClrMapping/>
+  </p:clrMapOvr>
+</p:sld>
+</file>
+
+<file path=ppt/slides/slide5.xml><?xml version="1.0" encoding="utf-8"?>
+<p:sld xmlns:a="http://schemas.openxmlformats.org/drawingml/2006/main" xmlns:r="http://schemas.openxmlformats.org/officeDocument/2006/relationships" xmlns:p="http://schemas.openxmlformats.org/presentationml/2006/main">
+  <p:cSld>
+    <p:spTree>
+      <p:nvGrpSpPr>
+        <p:cNvPr id="1" name=""/>
+        <p:cNvGrpSpPr/>
+        <p:nvPr/>
+      </p:nvGrpSpPr>
+      <p:grpSpPr>
+        <a:xfrm>
+          <a:off x="0" y="0"/>
+          <a:ext cx="0" cy="0"/>
+          <a:chOff x="0" y="0"/>
+          <a:chExt cx="0" cy="0"/>
+        </a:xfrm>
+      </p:grpSpPr>
+      <p:sp>
+        <p:nvSpPr>
+          <p:cNvPr id="2" name="Title 1">
+            <a:extLst>
+              <a:ext uri="{FF2B5EF4-FFF2-40B4-BE49-F238E27FC236}">
                 <a16:creationId xmlns:a16="http://schemas.microsoft.com/office/drawing/2014/main" id="{48827090-9B46-1680-C46C-613B87043513}"/>
               </a:ext>
             </a:extLst>
@@ -3798,7 +3930,7 @@
 </p:sld>
 </file>
 
-<file path=ppt/slides/slide5.xml><?xml version="1.0" encoding="utf-8"?>
+<file path=ppt/slides/slide6.xml><?xml version="1.0" encoding="utf-8"?>
 <p:sld xmlns:a="http://schemas.openxmlformats.org/drawingml/2006/main" xmlns:r="http://schemas.openxmlformats.org/officeDocument/2006/relationships" xmlns:p="http://schemas.openxmlformats.org/presentationml/2006/main">
   <p:cSld>
     <p:spTree>

</xml_diff>

<commit_message>
Fixed typos in status presentation.
</commit_message>
<xml_diff>
--- a/presentations/2025-04-10-rfc8561bis-status.pptx
+++ b/presentations/2025-04-10-rfc8561bis-status.pptx
@@ -264,7 +264,7 @@
           <a:p>
             <a:fld id="{FE4DAA4D-2DD7-B04C-A9A8-4DBE8BAD6685}" type="datetimeFigureOut">
               <a:rPr lang="en-US" smtClean="0"/>
-              <a:t>4/7/25</a:t>
+              <a:t>4/10/25</a:t>
             </a:fld>
             <a:endParaRPr lang="en-US"/>
           </a:p>
@@ -462,7 +462,7 @@
           <a:p>
             <a:fld id="{FE4DAA4D-2DD7-B04C-A9A8-4DBE8BAD6685}" type="datetimeFigureOut">
               <a:rPr lang="en-US" smtClean="0"/>
-              <a:t>4/7/25</a:t>
+              <a:t>4/10/25</a:t>
             </a:fld>
             <a:endParaRPr lang="en-US"/>
           </a:p>
@@ -670,7 +670,7 @@
           <a:p>
             <a:fld id="{FE4DAA4D-2DD7-B04C-A9A8-4DBE8BAD6685}" type="datetimeFigureOut">
               <a:rPr lang="en-US" smtClean="0"/>
-              <a:t>4/7/25</a:t>
+              <a:t>4/10/25</a:t>
             </a:fld>
             <a:endParaRPr lang="en-US"/>
           </a:p>
@@ -868,7 +868,7 @@
           <a:p>
             <a:fld id="{FE4DAA4D-2DD7-B04C-A9A8-4DBE8BAD6685}" type="datetimeFigureOut">
               <a:rPr lang="en-US" smtClean="0"/>
-              <a:t>4/7/25</a:t>
+              <a:t>4/10/25</a:t>
             </a:fld>
             <a:endParaRPr lang="en-US"/>
           </a:p>
@@ -1143,7 +1143,7 @@
           <a:p>
             <a:fld id="{FE4DAA4D-2DD7-B04C-A9A8-4DBE8BAD6685}" type="datetimeFigureOut">
               <a:rPr lang="en-US" smtClean="0"/>
-              <a:t>4/7/25</a:t>
+              <a:t>4/10/25</a:t>
             </a:fld>
             <a:endParaRPr lang="en-US"/>
           </a:p>
@@ -1408,7 +1408,7 @@
           <a:p>
             <a:fld id="{FE4DAA4D-2DD7-B04C-A9A8-4DBE8BAD6685}" type="datetimeFigureOut">
               <a:rPr lang="en-US" smtClean="0"/>
-              <a:t>4/7/25</a:t>
+              <a:t>4/10/25</a:t>
             </a:fld>
             <a:endParaRPr lang="en-US"/>
           </a:p>
@@ -1820,7 +1820,7 @@
           <a:p>
             <a:fld id="{FE4DAA4D-2DD7-B04C-A9A8-4DBE8BAD6685}" type="datetimeFigureOut">
               <a:rPr lang="en-US" smtClean="0"/>
-              <a:t>4/7/25</a:t>
+              <a:t>4/10/25</a:t>
             </a:fld>
             <a:endParaRPr lang="en-US"/>
           </a:p>
@@ -1961,7 +1961,7 @@
           <a:p>
             <a:fld id="{FE4DAA4D-2DD7-B04C-A9A8-4DBE8BAD6685}" type="datetimeFigureOut">
               <a:rPr lang="en-US" smtClean="0"/>
-              <a:t>4/7/25</a:t>
+              <a:t>4/10/25</a:t>
             </a:fld>
             <a:endParaRPr lang="en-US"/>
           </a:p>
@@ -2074,7 +2074,7 @@
           <a:p>
             <a:fld id="{FE4DAA4D-2DD7-B04C-A9A8-4DBE8BAD6685}" type="datetimeFigureOut">
               <a:rPr lang="en-US" smtClean="0"/>
-              <a:t>4/7/25</a:t>
+              <a:t>4/10/25</a:t>
             </a:fld>
             <a:endParaRPr lang="en-US"/>
           </a:p>
@@ -2385,7 +2385,7 @@
           <a:p>
             <a:fld id="{FE4DAA4D-2DD7-B04C-A9A8-4DBE8BAD6685}" type="datetimeFigureOut">
               <a:rPr lang="en-US" smtClean="0"/>
-              <a:t>4/7/25</a:t>
+              <a:t>4/10/25</a:t>
             </a:fld>
             <a:endParaRPr lang="en-US"/>
           </a:p>
@@ -2673,7 +2673,7 @@
           <a:p>
             <a:fld id="{FE4DAA4D-2DD7-B04C-A9A8-4DBE8BAD6685}" type="datetimeFigureOut">
               <a:rPr lang="en-US" smtClean="0"/>
-              <a:t>4/7/25</a:t>
+              <a:t>4/10/25</a:t>
             </a:fld>
             <a:endParaRPr lang="en-US"/>
           </a:p>
@@ -2914,7 +2914,7 @@
           <a:p>
             <a:fld id="{FE4DAA4D-2DD7-B04C-A9A8-4DBE8BAD6685}" type="datetimeFigureOut">
               <a:rPr lang="en-US" smtClean="0"/>
-              <a:t>4/7/25</a:t>
+              <a:t>4/10/25</a:t>
             </a:fld>
             <a:endParaRPr lang="en-US"/>
           </a:p>
@@ -3401,6 +3401,24 @@
             </a:r>
           </a:p>
           <a:p>
+            <a:r>
+              <a:rPr lang="en-US" dirty="0">
+                <a:solidFill>
+                  <a:srgbClr val="212529"/>
+                </a:solidFill>
+                <a:latin typeface="Inter"/>
+              </a:rPr>
+              <a:t>v3</a:t>
+            </a:r>
+            <a:endParaRPr lang="en-US" b="0" i="0" dirty="0">
+              <a:solidFill>
+                <a:srgbClr val="212529"/>
+              </a:solidFill>
+              <a:effectLst/>
+              <a:latin typeface="Inter"/>
+            </a:endParaRPr>
+          </a:p>
+          <a:p>
             <a:endParaRPr lang="en-US" dirty="0"/>
           </a:p>
         </p:txBody>
@@ -3630,8 +3648,13 @@
           <a:p>
             <a:r>
               <a:rPr lang="en-US" dirty="0"/>
-              <a:t>Added missing configuration parameter for minimum-nominal-power</a:t>
-            </a:r>
+              <a:t>Added missing configuration parameter for minimum-nominal-power and </a:t>
+            </a:r>
+            <a:r>
+              <a:rPr lang="en-US"/>
+              <a:t>reference modulation</a:t>
+            </a:r>
+            <a:endParaRPr lang="en-US" dirty="0"/>
           </a:p>
           <a:p>
             <a:r>
@@ -3648,13 +3671,8 @@
           <a:p>
             <a:r>
               <a:rPr lang="en-US" dirty="0"/>
-              <a:t>Deprecation of existing radio link terminal mode </a:t>
-            </a:r>
-            <a:r>
-              <a:rPr lang="en-US" dirty="0" err="1"/>
-              <a:t>defintion</a:t>
-            </a:r>
-            <a:endParaRPr lang="en-US" dirty="0"/>
+              <a:t>Deprecation of existing radio link terminal mode definition</a:t>
+            </a:r>
           </a:p>
           <a:p>
             <a:endParaRPr lang="en-US" dirty="0"/>

</xml_diff>